<commit_message>
status slides for IETF 123 as part of the Chair slides
</commit_message>
<xml_diff>
--- a/presentations/slides-123-anima-update-brski-with-pledge-in-responder-mode-brski-prm-for-chair.pptx
+++ b/presentations/slides-123-anima-update-brski-with-pledge-in-responder-mode-brski-prm-for-chair.pptx
@@ -5551,8 +5551,13 @@
             </a:pPr>
             <a:r>
               <a:rPr lang="en-US" sz="2400" dirty="0"/>
-              <a:t>Will remain with AD until RFC8633bis is done</a:t>
-            </a:r>
+              <a:t>Will remain with AD until RFC8633bis </a:t>
+            </a:r>
+            <a:r>
+              <a:rPr lang="en-US" sz="2400"/>
+              <a:t>is done </a:t>
+            </a:r>
+            <a:endParaRPr lang="en-US" sz="2400" dirty="0"/>
           </a:p>
           <a:p>
             <a:pPr lvl="1">
@@ -6605,15 +6610,6 @@
 </file>
 
 <file path=customXml/item1.xml><?xml version="1.0" encoding="utf-8"?>
-<?mso-contentType ?>
-<FormTemplates xmlns="http://schemas.microsoft.com/sharepoint/v3/contenttype/forms">
-  <Display>DocumentLibraryForm</Display>
-  <Edit>DocumentLibraryForm</Edit>
-  <New>DocumentLibraryForm</New>
-</FormTemplates>
-</file>
-
-<file path=customXml/item2.xml><?xml version="1.0" encoding="utf-8"?>
 <ct:contentTypeSchema xmlns:ct="http://schemas.microsoft.com/office/2006/metadata/contentType" xmlns:ma="http://schemas.microsoft.com/office/2006/metadata/properties/metaAttributes" ct:_="" ma:_="" ma:contentTypeName="Dokument" ma:contentTypeID="0x01010035CD6C532085F8449DFAA9E5E2A73509" ma:contentTypeVersion="22" ma:contentTypeDescription="Ein neues Dokument erstellen." ma:contentTypeScope="" ma:versionID="79025ec143ee1b8f4e002a25dcc445cd">
   <xsd:schema xmlns:xsd="http://www.w3.org/2001/XMLSchema" xmlns:xs="http://www.w3.org/2001/XMLSchema" xmlns:p="http://schemas.microsoft.com/office/2006/metadata/properties" xmlns:ns1="http://schemas.microsoft.com/sharepoint/v3" xmlns:ns2="ce079751-a51b-4a27-9376-edf93eae18d5" xmlns:ns3="a9de424c-86b2-47ed-8d4e-0a9b7010e669" xmlns:ns4="56810815-8df0-4f10-8da7-34164765fbe3" targetNamespace="http://schemas.microsoft.com/office/2006/metadata/properties" ma:root="true" ma:fieldsID="a349604d5808155358041a2fa3bfdc5c" ns1:_="" ns2:_="" ns3:_="" ns4:_="">
     <xsd:import namespace="http://schemas.microsoft.com/sharepoint/v3"/>
@@ -6890,6 +6886,15 @@
 </ct:contentTypeSchema>
 </file>
 
+<file path=customXml/item2.xml><?xml version="1.0" encoding="utf-8"?>
+<?mso-contentType ?>
+<FormTemplates xmlns="http://schemas.microsoft.com/sharepoint/v3/contenttype/forms">
+  <Display>DocumentLibraryForm</Display>
+  <Edit>DocumentLibraryForm</Edit>
+  <New>DocumentLibraryForm</New>
+</FormTemplates>
+</file>
+
 <file path=customXml/item3.xml><?xml version="1.0" encoding="utf-8"?>
 <p:properties xmlns:p="http://schemas.microsoft.com/office/2006/metadata/properties" xmlns:xsi="http://www.w3.org/2001/XMLSchema-instance" xmlns:pc="http://schemas.microsoft.com/office/infopath/2007/PartnerControls">
   <documentManagement>
@@ -6904,14 +6909,6 @@
 </file>
 
 <file path=customXml/itemProps1.xml><?xml version="1.0" encoding="utf-8"?>
-<ds:datastoreItem xmlns:ds="http://schemas.openxmlformats.org/officeDocument/2006/customXml" ds:itemID="{D24FD0D5-2F45-43E0-BE44-54B1E275E4BC}">
-  <ds:schemaRefs>
-    <ds:schemaRef ds:uri="http://schemas.microsoft.com/sharepoint/v3/contenttype/forms"/>
-  </ds:schemaRefs>
-</ds:datastoreItem>
-</file>
-
-<file path=customXml/itemProps2.xml><?xml version="1.0" encoding="utf-8"?>
 <ds:datastoreItem xmlns:ds="http://schemas.openxmlformats.org/officeDocument/2006/customXml" ds:itemID="{ED4F657C-2D71-40B5-9B4F-EEE28F4C1523}">
   <ds:schemaRefs>
     <ds:schemaRef ds:uri="http://schemas.microsoft.com/office/2006/metadata/contentType"/>
@@ -6928,6 +6925,14 @@
     <ds:schemaRef ds:uri="http://purl.org/dc/elements/1.1/"/>
     <ds:schemaRef ds:uri="http://purl.org/dc/terms/"/>
     <ds:schemaRef ds:uri="http://schemas.microsoft.com/internal/obd"/>
+  </ds:schemaRefs>
+</ds:datastoreItem>
+</file>
+
+<file path=customXml/itemProps2.xml><?xml version="1.0" encoding="utf-8"?>
+<ds:datastoreItem xmlns:ds="http://schemas.openxmlformats.org/officeDocument/2006/customXml" ds:itemID="{D24FD0D5-2F45-43E0-BE44-54B1E275E4BC}">
+  <ds:schemaRefs>
+    <ds:schemaRef ds:uri="http://schemas.microsoft.com/sharepoint/v3/contenttype/forms"/>
   </ds:schemaRefs>
 </ds:datastoreItem>
 </file>

</xml_diff>